<commit_message>
minor update in binary search code
</commit_message>
<xml_diff>
--- a/ppt/Binary search algorithm.pptx
+++ b/ppt/Binary search algorithm.pptx
@@ -8861,14 +8861,14 @@
             <a:pPr lvl="1"/>
             <a:r>
               <a:rPr lang="en-IN" dirty="0"/>
-              <a:t>Average case – O(1)</a:t>
+              <a:t>Average case – O(log n)</a:t>
             </a:r>
           </a:p>
           <a:p>
             <a:pPr lvl="1"/>
             <a:r>
               <a:rPr lang="en-IN" dirty="0"/>
-              <a:t>Best case – O(log n)</a:t>
+              <a:t>Best case – O(1)</a:t>
             </a:r>
           </a:p>
           <a:p>

</xml_diff>